<commit_message>
Add comments for all functions.
</commit_message>
<xml_diff>
--- a/quarterly-review/SlrpEV-Quarterly-2022.pptx
+++ b/quarterly-review/SlrpEV-Quarterly-2022.pptx
@@ -278,6 +278,120 @@
     </p:ext>
   </p:extLst>
 </p:presentation>
+</file>
+
+<file path=ppt/revisionInfo.xml><?xml version="1.0" encoding="utf-8"?>
+<p1510:revInfo xmlns:a="http://schemas.openxmlformats.org/drawingml/2006/main" xmlns:r="http://schemas.openxmlformats.org/officeDocument/2006/relationships" xmlns:p1510="http://schemas.microsoft.com/office/powerpoint/2015/10/main">
+  <p1510:revLst>
+    <p1510:client id="{64A3305C-1BFA-7C48-B3F0-039FAE95C60C}" v="2" dt="2022-11-23T23:26:33.166"/>
+  </p1510:revLst>
+</p1510:revInfo>
+</file>
+
+<file path=ppt/changesInfos/changesInfo1.xml><?xml version="1.0" encoding="utf-8"?>
+<pc:chgInfo xmlns:a="http://schemas.openxmlformats.org/drawingml/2006/main" xmlns:r="http://schemas.openxmlformats.org/officeDocument/2006/relationships" xmlns:ac="http://schemas.microsoft.com/office/drawing/2013/main/command" xmlns:pc="http://schemas.microsoft.com/office/powerpoint/2013/main/command">
+  <pc:docChgLst>
+    <pc:chgData name="XU Yifei" userId="e79926bdc9def69f" providerId="LiveId" clId="{64A3305C-1BFA-7C48-B3F0-039FAE95C60C}"/>
+    <pc:docChg chg="undo custSel modSld">
+      <pc:chgData name="XU Yifei" userId="e79926bdc9def69f" providerId="LiveId" clId="{64A3305C-1BFA-7C48-B3F0-039FAE95C60C}" dt="2022-11-23T23:58:10.732" v="41" actId="20577"/>
+      <pc:docMkLst>
+        <pc:docMk/>
+      </pc:docMkLst>
+      <pc:sldChg chg="modSp mod">
+        <pc:chgData name="XU Yifei" userId="e79926bdc9def69f" providerId="LiveId" clId="{64A3305C-1BFA-7C48-B3F0-039FAE95C60C}" dt="2022-11-23T23:29:16.308" v="10" actId="1076"/>
+        <pc:sldMkLst>
+          <pc:docMk/>
+          <pc:sldMk cId="0" sldId="263"/>
+        </pc:sldMkLst>
+        <pc:picChg chg="mod">
+          <ac:chgData name="XU Yifei" userId="e79926bdc9def69f" providerId="LiveId" clId="{64A3305C-1BFA-7C48-B3F0-039FAE95C60C}" dt="2022-11-23T23:29:16.308" v="10" actId="1076"/>
+          <ac:picMkLst>
+            <pc:docMk/>
+            <pc:sldMk cId="0" sldId="263"/>
+            <ac:picMk id="4" creationId="{4DD47ED8-24DB-7414-0739-22F041992015}"/>
+          </ac:picMkLst>
+        </pc:picChg>
+      </pc:sldChg>
+      <pc:sldChg chg="modSp">
+        <pc:chgData name="XU Yifei" userId="e79926bdc9def69f" providerId="LiveId" clId="{64A3305C-1BFA-7C48-B3F0-039FAE95C60C}" dt="2022-11-23T23:26:33.166" v="8" actId="20578"/>
+        <pc:sldMkLst>
+          <pc:docMk/>
+          <pc:sldMk cId="2734509693" sldId="264"/>
+        </pc:sldMkLst>
+        <pc:spChg chg="mod">
+          <ac:chgData name="XU Yifei" userId="e79926bdc9def69f" providerId="LiveId" clId="{64A3305C-1BFA-7C48-B3F0-039FAE95C60C}" dt="2022-11-23T23:26:33.166" v="8" actId="20578"/>
+          <ac:spMkLst>
+            <pc:docMk/>
+            <pc:sldMk cId="2734509693" sldId="264"/>
+            <ac:spMk id="2" creationId="{326BEF82-29CD-7DC8-5B43-0DE5D819E720}"/>
+          </ac:spMkLst>
+        </pc:spChg>
+      </pc:sldChg>
+      <pc:sldChg chg="modSp mod modNotesTx">
+        <pc:chgData name="XU Yifei" userId="e79926bdc9def69f" providerId="LiveId" clId="{64A3305C-1BFA-7C48-B3F0-039FAE95C60C}" dt="2022-11-23T23:58:10.732" v="41" actId="20577"/>
+        <pc:sldMkLst>
+          <pc:docMk/>
+          <pc:sldMk cId="2565784882" sldId="265"/>
+        </pc:sldMkLst>
+        <pc:picChg chg="mod">
+          <ac:chgData name="XU Yifei" userId="e79926bdc9def69f" providerId="LiveId" clId="{64A3305C-1BFA-7C48-B3F0-039FAE95C60C}" dt="2022-11-23T22:35:27.643" v="0" actId="14100"/>
+          <ac:picMkLst>
+            <pc:docMk/>
+            <pc:sldMk cId="2565784882" sldId="265"/>
+            <ac:picMk id="7" creationId="{8F87F913-9E52-15D2-A578-877A424E77CD}"/>
+          </ac:picMkLst>
+        </pc:picChg>
+      </pc:sldChg>
+      <pc:sldChg chg="modSp mod">
+        <pc:chgData name="XU Yifei" userId="e79926bdc9def69f" providerId="LiveId" clId="{64A3305C-1BFA-7C48-B3F0-039FAE95C60C}" dt="2022-11-23T23:43:54.520" v="11" actId="14100"/>
+        <pc:sldMkLst>
+          <pc:docMk/>
+          <pc:sldMk cId="3181187360" sldId="266"/>
+        </pc:sldMkLst>
+        <pc:spChg chg="mod">
+          <ac:chgData name="XU Yifei" userId="e79926bdc9def69f" providerId="LiveId" clId="{64A3305C-1BFA-7C48-B3F0-039FAE95C60C}" dt="2022-11-23T23:43:54.520" v="11" actId="14100"/>
+          <ac:spMkLst>
+            <pc:docMk/>
+            <pc:sldMk cId="3181187360" sldId="266"/>
+            <ac:spMk id="2" creationId="{326BEF82-29CD-7DC8-5B43-0DE5D819E720}"/>
+          </ac:spMkLst>
+        </pc:spChg>
+        <pc:spChg chg="mod">
+          <ac:chgData name="XU Yifei" userId="e79926bdc9def69f" providerId="LiveId" clId="{64A3305C-1BFA-7C48-B3F0-039FAE95C60C}" dt="2022-11-23T22:35:57.504" v="4" actId="1076"/>
+          <ac:spMkLst>
+            <pc:docMk/>
+            <pc:sldMk cId="3181187360" sldId="266"/>
+            <ac:spMk id="8" creationId="{ED44D5F4-5754-49CD-45EF-71610D964B86}"/>
+          </ac:spMkLst>
+        </pc:spChg>
+        <pc:spChg chg="mod">
+          <ac:chgData name="XU Yifei" userId="e79926bdc9def69f" providerId="LiveId" clId="{64A3305C-1BFA-7C48-B3F0-039FAE95C60C}" dt="2022-11-23T22:35:53.001" v="3" actId="1076"/>
+          <ac:spMkLst>
+            <pc:docMk/>
+            <pc:sldMk cId="3181187360" sldId="266"/>
+            <ac:spMk id="9" creationId="{65153A87-69D3-13F3-8F66-EFBCCD085E30}"/>
+          </ac:spMkLst>
+        </pc:spChg>
+        <pc:spChg chg="mod">
+          <ac:chgData name="XU Yifei" userId="e79926bdc9def69f" providerId="LiveId" clId="{64A3305C-1BFA-7C48-B3F0-039FAE95C60C}" dt="2022-11-23T22:35:41.001" v="1" actId="1076"/>
+          <ac:spMkLst>
+            <pc:docMk/>
+            <pc:sldMk cId="3181187360" sldId="266"/>
+            <ac:spMk id="11" creationId="{F87490EE-73C8-C011-6FFA-B9940414FEBB}"/>
+          </ac:spMkLst>
+        </pc:spChg>
+        <pc:spChg chg="mod">
+          <ac:chgData name="XU Yifei" userId="e79926bdc9def69f" providerId="LiveId" clId="{64A3305C-1BFA-7C48-B3F0-039FAE95C60C}" dt="2022-11-23T22:35:46.839" v="2" actId="1076"/>
+          <ac:spMkLst>
+            <pc:docMk/>
+            <pc:sldMk cId="3181187360" sldId="266"/>
+            <ac:spMk id="12" creationId="{F76217C1-AE60-BF13-DA7C-D5AF5E2F7ED4}"/>
+          </ac:spMkLst>
+        </pc:spChg>
+      </pc:sldChg>
+    </pc:docChg>
+  </pc:docChgLst>
+</pc:chgInfo>
 </file>
 
 <file path=ppt/notesMasters/notesMaster1.xml><?xml version="1.0" encoding="utf-8"?>
@@ -1130,7 +1244,39 @@
               </a:spcAft>
               <a:buNone/>
             </a:pPr>
-            <a:endParaRPr/>
+            <a:r>
+              <a:rPr lang="en-US" altLang="zh-CN" dirty="0"/>
+              <a:t>300</a:t>
+            </a:r>
+            <a:r>
+              <a:rPr lang="zh-CN" altLang="en-US" dirty="0"/>
+              <a:t> </a:t>
+            </a:r>
+            <a:r>
+              <a:rPr lang="en-US" dirty="0"/>
+              <a:t>Cent</a:t>
+            </a:r>
+            <a:r>
+              <a:rPr lang="en-US" altLang="zh-CN" dirty="0"/>
+              <a:t>s</a:t>
+            </a:r>
+            <a:r>
+              <a:rPr lang="zh-CN" altLang="en-US" dirty="0"/>
+              <a:t> </a:t>
+            </a:r>
+            <a:r>
+              <a:rPr lang="en-US" altLang="zh-CN" dirty="0"/>
+              <a:t>/</a:t>
+            </a:r>
+            <a:r>
+              <a:rPr lang="zh-CN" altLang="en-US" dirty="0"/>
+              <a:t> </a:t>
+            </a:r>
+            <a:r>
+              <a:rPr lang="en-US" altLang="zh-CN" dirty="0"/>
+              <a:t>kwh.</a:t>
+            </a:r>
+            <a:endParaRPr dirty="0"/>
           </a:p>
         </p:txBody>
       </p:sp>
@@ -9922,8 +10068,8 @@
         </p:blipFill>
         <p:spPr>
           <a:xfrm>
-            <a:off x="5370575" y="755895"/>
-            <a:ext cx="3282104" cy="2508158"/>
+            <a:off x="5460259" y="824431"/>
+            <a:ext cx="3192420" cy="2439622"/>
           </a:xfrm>
           <a:prstGeom prst="rect">
             <a:avLst/>
@@ -9960,8 +10106,8 @@
           </a:prstGeom>
         </p:spPr>
       </p:pic>
-      <mc:AlternateContent xmlns:mc="http://schemas.openxmlformats.org/markup-compatibility/2006">
-        <mc:Choice xmlns:a14="http://schemas.microsoft.com/office/drawing/2010/main" Requires="a14">
+      <mc:AlternateContent xmlns:mc="http://schemas.openxmlformats.org/markup-compatibility/2006" xmlns:a14="http://schemas.microsoft.com/office/drawing/2010/main">
+        <mc:Choice Requires="a14">
           <p:sp>
             <p:nvSpPr>
               <p:cNvPr id="3" name="TextBox 2">
@@ -10185,7 +10331,7 @@
             </p:txBody>
           </p:sp>
         </mc:Choice>
-        <mc:Fallback>
+        <mc:Fallback xmlns="">
           <p:sp>
             <p:nvSpPr>
               <p:cNvPr id="3" name="TextBox 2">
@@ -10384,8 +10530,8 @@
         </p:nvSpPr>
         <p:spPr>
           <a:xfrm>
-            <a:off x="524507" y="3294112"/>
-            <a:ext cx="8411675" cy="707886"/>
+            <a:off x="420625" y="3321302"/>
+            <a:ext cx="8600533" cy="707886"/>
           </a:xfrm>
           <a:prstGeom prst="rect">
             <a:avLst/>
@@ -10412,15 +10558,31 @@
                 <a:latin typeface="Times New Roman" panose="02020603050405020304" pitchFamily="18" charset="0"/>
                 <a:cs typeface="Times New Roman" panose="02020603050405020304" pitchFamily="18" charset="0"/>
               </a:rPr>
-              <a:t>is modeled by tracking the maximum total</a:t>
-            </a:r>
-            <a:r>
-              <a:rPr lang="zh-CN" altLang="en-US" sz="2000" dirty="0">
+              <a:t>is modeled by tracking the </a:t>
+            </a:r>
+            <a:r>
+              <a:rPr lang="en-US" sz="2000" b="1" dirty="0">
                 <a:effectLst/>
                 <a:latin typeface="Times New Roman" panose="02020603050405020304" pitchFamily="18" charset="0"/>
                 <a:cs typeface="Times New Roman" panose="02020603050405020304" pitchFamily="18" charset="0"/>
               </a:rPr>
+              <a:t>maximum total</a:t>
+            </a:r>
+            <a:r>
+              <a:rPr lang="zh-CN" altLang="en-US" sz="2000" b="1" dirty="0">
+                <a:effectLst/>
+                <a:latin typeface="Times New Roman" panose="02020603050405020304" pitchFamily="18" charset="0"/>
+                <a:cs typeface="Times New Roman" panose="02020603050405020304" pitchFamily="18" charset="0"/>
+              </a:rPr>
               <a:t> </a:t>
+            </a:r>
+            <a:r>
+              <a:rPr lang="en-US" sz="2000" b="1" dirty="0">
+                <a:effectLst/>
+                <a:latin typeface="Times New Roman" panose="02020603050405020304" pitchFamily="18" charset="0"/>
+                <a:cs typeface="Times New Roman" panose="02020603050405020304" pitchFamily="18" charset="0"/>
+              </a:rPr>
+              <a:t>power consumption </a:t>
             </a:r>
             <a:r>
               <a:rPr lang="en-US" sz="2000" dirty="0">
@@ -10428,7 +10590,7 @@
                 <a:latin typeface="Times New Roman" panose="02020603050405020304" pitchFamily="18" charset="0"/>
                 <a:cs typeface="Times New Roman" panose="02020603050405020304" pitchFamily="18" charset="0"/>
               </a:rPr>
-              <a:t>power consumption seen up to the current time.</a:t>
+              <a:t>seen up to the current time.</a:t>
             </a:r>
           </a:p>
         </p:txBody>
@@ -10463,8 +10625,8 @@
           </a:prstGeom>
         </p:spPr>
       </p:pic>
-      <mc:AlternateContent xmlns:mc="http://schemas.openxmlformats.org/markup-compatibility/2006">
-        <mc:Choice xmlns:a14="http://schemas.microsoft.com/office/drawing/2010/main" Requires="a14">
+      <mc:AlternateContent xmlns:mc="http://schemas.openxmlformats.org/markup-compatibility/2006" xmlns:a14="http://schemas.microsoft.com/office/drawing/2010/main">
+        <mc:Choice Requires="a14">
           <p:sp>
             <p:nvSpPr>
               <p:cNvPr id="7" name="TextBox 6">
@@ -10742,7 +10904,7 @@
             </p:txBody>
           </p:sp>
         </mc:Choice>
-        <mc:Fallback>
+        <mc:Fallback xmlns="">
           <p:sp>
             <p:nvSpPr>
               <p:cNvPr id="7" name="TextBox 6">
@@ -10806,7 +10968,7 @@
         </p:nvSpPr>
         <p:spPr>
           <a:xfrm>
-            <a:off x="4572000" y="1063052"/>
+            <a:off x="4572000" y="1114312"/>
             <a:ext cx="2589170" cy="369332"/>
           </a:xfrm>
           <a:prstGeom prst="rect">
@@ -10890,7 +11052,7 @@
         </p:nvSpPr>
         <p:spPr>
           <a:xfrm>
-            <a:off x="4572000" y="1624204"/>
+            <a:off x="4572000" y="1655360"/>
             <a:ext cx="2961067" cy="369332"/>
           </a:xfrm>
           <a:prstGeom prst="rect">
@@ -11044,7 +11206,7 @@
         </p:nvSpPr>
         <p:spPr>
           <a:xfrm>
-            <a:off x="4572000" y="2577407"/>
+            <a:off x="4572000" y="2608013"/>
             <a:ext cx="2287806" cy="369332"/>
           </a:xfrm>
           <a:prstGeom prst="rect">
@@ -11114,7 +11276,7 @@
         </p:nvSpPr>
         <p:spPr>
           <a:xfrm>
-            <a:off x="4572000" y="2269900"/>
+            <a:off x="4572000" y="2299458"/>
             <a:ext cx="2313454" cy="369332"/>
           </a:xfrm>
           <a:prstGeom prst="rect">

</xml_diff>